<commit_message>
update UI diagram in DG
</commit_message>
<xml_diff>
--- a/docs/diagrams/Diagrams_UI.pptx
+++ b/docs/diagrams/Diagrams_UI.pptx
@@ -209,7 +209,7 @@
           <a:p>
             <a:fld id="{F5CC4B3F-88C1-4FFA-B1B6-F41C21DC6924}" type="datetimeFigureOut">
               <a:rPr lang="en-US" smtClean="0"/>
-              <a:t>10/18/16</a:t>
+              <a:t>11/6/16</a:t>
             </a:fld>
             <a:endParaRPr lang="en-US"/>
           </a:p>
@@ -747,7 +747,7 @@
           <a:p>
             <a:fld id="{78C97017-6FC3-485B-9764-EAC9E56C1D49}" type="datetimeFigureOut">
               <a:rPr lang="en-US" smtClean="0"/>
-              <a:t>10/18/16</a:t>
+              <a:t>11/6/16</a:t>
             </a:fld>
             <a:endParaRPr lang="en-US"/>
           </a:p>
@@ -917,7 +917,7 @@
           <a:p>
             <a:fld id="{78C97017-6FC3-485B-9764-EAC9E56C1D49}" type="datetimeFigureOut">
               <a:rPr lang="en-US" smtClean="0"/>
-              <a:t>10/18/16</a:t>
+              <a:t>11/6/16</a:t>
             </a:fld>
             <a:endParaRPr lang="en-US"/>
           </a:p>
@@ -1097,7 +1097,7 @@
           <a:p>
             <a:fld id="{78C97017-6FC3-485B-9764-EAC9E56C1D49}" type="datetimeFigureOut">
               <a:rPr lang="en-US" smtClean="0"/>
-              <a:t>10/18/16</a:t>
+              <a:t>11/6/16</a:t>
             </a:fld>
             <a:endParaRPr lang="en-US"/>
           </a:p>
@@ -1267,7 +1267,7 @@
           <a:p>
             <a:fld id="{78C97017-6FC3-485B-9764-EAC9E56C1D49}" type="datetimeFigureOut">
               <a:rPr lang="en-US" smtClean="0"/>
-              <a:t>10/18/16</a:t>
+              <a:t>11/6/16</a:t>
             </a:fld>
             <a:endParaRPr lang="en-US"/>
           </a:p>
@@ -1513,7 +1513,7 @@
           <a:p>
             <a:fld id="{78C97017-6FC3-485B-9764-EAC9E56C1D49}" type="datetimeFigureOut">
               <a:rPr lang="en-US" smtClean="0"/>
-              <a:t>10/18/16</a:t>
+              <a:t>11/6/16</a:t>
             </a:fld>
             <a:endParaRPr lang="en-US"/>
           </a:p>
@@ -1801,7 +1801,7 @@
           <a:p>
             <a:fld id="{78C97017-6FC3-485B-9764-EAC9E56C1D49}" type="datetimeFigureOut">
               <a:rPr lang="en-US" smtClean="0"/>
-              <a:t>10/18/16</a:t>
+              <a:t>11/6/16</a:t>
             </a:fld>
             <a:endParaRPr lang="en-US"/>
           </a:p>
@@ -2223,7 +2223,7 @@
           <a:p>
             <a:fld id="{78C97017-6FC3-485B-9764-EAC9E56C1D49}" type="datetimeFigureOut">
               <a:rPr lang="en-US" smtClean="0"/>
-              <a:t>10/18/16</a:t>
+              <a:t>11/6/16</a:t>
             </a:fld>
             <a:endParaRPr lang="en-US"/>
           </a:p>
@@ -2341,7 +2341,7 @@
           <a:p>
             <a:fld id="{78C97017-6FC3-485B-9764-EAC9E56C1D49}" type="datetimeFigureOut">
               <a:rPr lang="en-US" smtClean="0"/>
-              <a:t>10/18/16</a:t>
+              <a:t>11/6/16</a:t>
             </a:fld>
             <a:endParaRPr lang="en-US"/>
           </a:p>
@@ -2436,7 +2436,7 @@
           <a:p>
             <a:fld id="{78C97017-6FC3-485B-9764-EAC9E56C1D49}" type="datetimeFigureOut">
               <a:rPr lang="en-US" smtClean="0"/>
-              <a:t>10/18/16</a:t>
+              <a:t>11/6/16</a:t>
             </a:fld>
             <a:endParaRPr lang="en-US"/>
           </a:p>
@@ -2713,7 +2713,7 @@
           <a:p>
             <a:fld id="{78C97017-6FC3-485B-9764-EAC9E56C1D49}" type="datetimeFigureOut">
               <a:rPr lang="en-US" smtClean="0"/>
-              <a:t>10/18/16</a:t>
+              <a:t>11/6/16</a:t>
             </a:fld>
             <a:endParaRPr lang="en-US"/>
           </a:p>
@@ -2966,7 +2966,7 @@
           <a:p>
             <a:fld id="{78C97017-6FC3-485B-9764-EAC9E56C1D49}" type="datetimeFigureOut">
               <a:rPr lang="en-US" smtClean="0"/>
-              <a:t>10/18/16</a:t>
+              <a:t>11/6/16</a:t>
             </a:fld>
             <a:endParaRPr lang="en-US"/>
           </a:p>
@@ -3179,7 +3179,7 @@
           <a:p>
             <a:fld id="{78C97017-6FC3-485B-9764-EAC9E56C1D49}" type="datetimeFigureOut">
               <a:rPr lang="en-US" smtClean="0"/>
-              <a:t>10/18/16</a:t>
+              <a:t>11/6/16</a:t>
             </a:fld>
             <a:endParaRPr lang="en-US"/>
           </a:p>
@@ -4117,7 +4117,7 @@
         </p:nvSpPr>
         <p:spPr>
           <a:xfrm>
-            <a:off x="4108343" y="4002941"/>
+            <a:off x="4313164" y="4010567"/>
             <a:ext cx="1040906" cy="236841"/>
           </a:xfrm>
           <a:prstGeom prst="rect">
@@ -4590,8 +4590,8 @@
         </p:nvCxnSpPr>
         <p:spPr>
           <a:xfrm rot="5400000">
-            <a:off x="3911626" y="2348880"/>
-            <a:ext cx="3010109" cy="534855"/>
+            <a:off x="4010220" y="2455103"/>
+            <a:ext cx="3017735" cy="330034"/>
           </a:xfrm>
           <a:prstGeom prst="bentConnector2">
             <a:avLst/>
@@ -5206,47 +5206,6 @@
             </a:solidFill>
             <a:headEnd type="none" w="med" len="med"/>
             <a:tailEnd type="none" w="med" len="med"/>
-          </a:ln>
-          <a:effectLst/>
-        </p:spPr>
-        <p:style>
-          <a:lnRef idx="1">
-            <a:schemeClr val="accent2"/>
-          </a:lnRef>
-          <a:fillRef idx="2">
-            <a:schemeClr val="accent2"/>
-          </a:fillRef>
-          <a:effectRef idx="1">
-            <a:schemeClr val="accent2"/>
-          </a:effectRef>
-          <a:fontRef idx="minor">
-            <a:schemeClr val="dk1"/>
-          </a:fontRef>
-        </p:style>
-      </p:cxnSp>
-      <p:cxnSp>
-        <p:nvCxnSpPr>
-          <p:cNvPr id="137" name="Elbow Connector 136"/>
-          <p:cNvCxnSpPr>
-            <a:stCxn id="36" idx="2"/>
-            <a:endCxn id="37" idx="1"/>
-          </p:cNvCxnSpPr>
-          <p:nvPr/>
-        </p:nvCxnSpPr>
-        <p:spPr>
-          <a:xfrm rot="16200000" flipH="1">
-            <a:off x="3665643" y="3678662"/>
-            <a:ext cx="114512" cy="770887"/>
-          </a:xfrm>
-          <a:prstGeom prst="bentConnector2">
-            <a:avLst/>
-          </a:prstGeom>
-          <a:ln w="19050">
-            <a:solidFill>
-              <a:schemeClr val="accent3"/>
-            </a:solidFill>
-            <a:headEnd type="none" w="med" len="med"/>
-            <a:tailEnd type="arrow" w="med" len="med"/>
           </a:ln>
           <a:effectLst/>
         </p:spPr>
@@ -5786,7 +5745,7 @@
         <p:spPr>
           <a:xfrm>
             <a:off x="3600847" y="4509042"/>
-            <a:ext cx="1199164" cy="218575"/>
+            <a:ext cx="968455" cy="203835"/>
           </a:xfrm>
           <a:prstGeom prst="rect">
             <a:avLst/>
@@ -5848,8 +5807,8 @@
         </p:nvCxnSpPr>
         <p:spPr>
           <a:xfrm rot="16200000" flipH="1">
-            <a:off x="3163411" y="4180894"/>
-            <a:ext cx="611480" cy="263391"/>
+            <a:off x="3167096" y="4177209"/>
+            <a:ext cx="604110" cy="263391"/>
           </a:xfrm>
           <a:prstGeom prst="bentConnector2">
             <a:avLst/>
@@ -5883,18 +5842,17 @@
           <p:cNvPr id="113" name="Elbow Connector 63"/>
           <p:cNvCxnSpPr>
             <a:stCxn id="16" idx="3"/>
+            <a:endCxn id="108" idx="3"/>
           </p:cNvCxnSpPr>
           <p:nvPr/>
         </p:nvCxnSpPr>
         <p:spPr>
           <a:xfrm rot="5400000">
-            <a:off x="3490250" y="2428819"/>
-            <a:ext cx="3511420" cy="876289"/>
-          </a:xfrm>
-          <a:prstGeom prst="bentConnector3">
-            <a:avLst>
-              <a:gd name="adj1" fmla="val 99738"/>
-            </a:avLst>
+            <a:off x="3376850" y="2303705"/>
+            <a:ext cx="3499707" cy="1114802"/>
+          </a:xfrm>
+          <a:prstGeom prst="bentConnector2">
+            <a:avLst/>
           </a:prstGeom>
           <a:ln w="6350">
             <a:solidFill>
@@ -5923,18 +5881,19 @@
       <p:cxnSp>
         <p:nvCxnSpPr>
           <p:cNvPr id="122" name="Elbow Connector 121"/>
-          <p:cNvCxnSpPr/>
+          <p:cNvCxnSpPr>
+            <a:stCxn id="108" idx="0"/>
+            <a:endCxn id="37" idx="1"/>
+          </p:cNvCxnSpPr>
           <p:nvPr/>
         </p:nvCxnSpPr>
         <p:spPr>
           <a:xfrm rot="5400000" flipH="1" flipV="1">
-            <a:off x="4292158" y="4170232"/>
-            <a:ext cx="259228" cy="427079"/>
-          </a:xfrm>
-          <a:prstGeom prst="bentConnector3">
-            <a:avLst>
-              <a:gd name="adj1" fmla="val 50000"/>
-            </a:avLst>
+            <a:off x="4009092" y="4204971"/>
+            <a:ext cx="380054" cy="228089"/>
+          </a:xfrm>
+          <a:prstGeom prst="bentConnector2">
+            <a:avLst/>
           </a:prstGeom>
           <a:ln w="19050">
             <a:solidFill>
@@ -6031,8 +5990,8 @@
         </p:nvCxnSpPr>
         <p:spPr>
           <a:xfrm rot="16200000" flipH="1">
-            <a:off x="4176721" y="4751325"/>
-            <a:ext cx="323663" cy="276240"/>
+            <a:off x="4111672" y="4686280"/>
+            <a:ext cx="338400" cy="391594"/>
           </a:xfrm>
           <a:prstGeom prst="bentConnector2">
             <a:avLst/>
@@ -6418,7 +6377,7 @@
         </p:nvSpPr>
         <p:spPr>
           <a:xfrm>
-            <a:off x="3582655" y="2977727"/>
+            <a:off x="3581134" y="2939549"/>
             <a:ext cx="179150" cy="230832"/>
           </a:xfrm>
           <a:prstGeom prst="rect">
@@ -6433,8 +6392,8 @@
           <a:lstStyle/>
           <a:p>
             <a:r>
-              <a:rPr lang="zh-CN" altLang="en-US" sz="900" dirty="0" smtClean="0"/>
-              <a:t>*</a:t>
+              <a:rPr lang="en-US" altLang="zh-CN" sz="900" dirty="0" smtClean="0"/>
+              <a:t>2</a:t>
             </a:r>
             <a:endParaRPr lang="en-US" sz="900" dirty="0"/>
           </a:p>
@@ -6463,7 +6422,7 @@
           <a:lstStyle/>
           <a:p>
             <a:r>
-              <a:rPr lang="zh-CN" altLang="en-US" sz="900" smtClean="0"/>
+              <a:rPr lang="zh-CN" altLang="en-US" sz="900" dirty="0" smtClean="0"/>
               <a:t>*</a:t>
             </a:r>
             <a:endParaRPr lang="en-US" sz="900" dirty="0"/>
@@ -6472,13 +6431,13 @@
       </p:sp>
       <p:sp>
         <p:nvSpPr>
-          <p:cNvPr id="114" name="TextBox 113"/>
+          <p:cNvPr id="115" name="TextBox 114"/>
           <p:cNvSpPr txBox="1"/>
           <p:nvPr/>
         </p:nvSpPr>
         <p:spPr>
           <a:xfrm>
-            <a:off x="3405826" y="4421515"/>
+            <a:off x="4110661" y="3386086"/>
             <a:ext cx="179150" cy="230832"/>
           </a:xfrm>
           <a:prstGeom prst="rect">
@@ -6493,7 +6452,7 @@
           <a:lstStyle/>
           <a:p>
             <a:r>
-              <a:rPr lang="zh-CN" altLang="en-US" sz="900" smtClean="0"/>
+              <a:rPr lang="zh-CN" altLang="en-US" sz="900" dirty="0" smtClean="0"/>
               <a:t>*</a:t>
             </a:r>
             <a:endParaRPr lang="en-US" sz="900" dirty="0"/>
@@ -6502,13 +6461,13 @@
       </p:sp>
       <p:sp>
         <p:nvSpPr>
-          <p:cNvPr id="115" name="TextBox 114"/>
+          <p:cNvPr id="74" name="TextBox 73"/>
           <p:cNvSpPr txBox="1"/>
           <p:nvPr/>
         </p:nvSpPr>
         <p:spPr>
           <a:xfrm>
-            <a:off x="4110661" y="3386086"/>
+            <a:off x="3412737" y="4416351"/>
             <a:ext cx="179150" cy="230832"/>
           </a:xfrm>
           <a:prstGeom prst="rect">
@@ -6523,7 +6482,7 @@
           <a:lstStyle/>
           <a:p>
             <a:r>
-              <a:rPr lang="zh-CN" altLang="en-US" sz="900" smtClean="0"/>
+              <a:rPr lang="zh-CN" altLang="en-US" sz="900" dirty="0" smtClean="0"/>
               <a:t>*</a:t>
             </a:r>
             <a:endParaRPr lang="en-US" sz="900" dirty="0"/>
@@ -6532,14 +6491,14 @@
       </p:sp>
       <p:sp>
         <p:nvSpPr>
-          <p:cNvPr id="123" name="TextBox 122"/>
+          <p:cNvPr id="76" name="TextBox 75"/>
           <p:cNvSpPr txBox="1"/>
           <p:nvPr/>
         </p:nvSpPr>
         <p:spPr>
           <a:xfrm>
-            <a:off x="3799959" y="3924510"/>
-            <a:ext cx="429320" cy="230832"/>
+            <a:off x="4080618" y="3945421"/>
+            <a:ext cx="179150" cy="230832"/>
           </a:xfrm>
           <a:prstGeom prst="rect">
             <a:avLst/>
@@ -6554,37 +6513,7 @@
           <a:p>
             <a:r>
               <a:rPr lang="en-US" altLang="zh-CN" sz="900" smtClean="0"/>
-              <a:t>0..1</a:t>
-            </a:r>
-            <a:endParaRPr lang="en-US" sz="900" dirty="0"/>
-          </a:p>
-        </p:txBody>
-      </p:sp>
-      <p:sp>
-        <p:nvSpPr>
-          <p:cNvPr id="124" name="TextBox 123"/>
-          <p:cNvSpPr txBox="1"/>
-          <p:nvPr/>
-        </p:nvSpPr>
-        <p:spPr>
-          <a:xfrm>
-            <a:off x="4618957" y="4185688"/>
-            <a:ext cx="429320" cy="230832"/>
-          </a:xfrm>
-          <a:prstGeom prst="rect">
-            <a:avLst/>
-          </a:prstGeom>
-          <a:noFill/>
-        </p:spPr>
-        <p:txBody>
-          <a:bodyPr wrap="square" rtlCol="0">
-            <a:spAutoFit/>
-          </a:bodyPr>
-          <a:lstStyle/>
-          <a:p>
-            <a:r>
-              <a:rPr lang="en-US" altLang="zh-CN" sz="900" smtClean="0"/>
-              <a:t>0..1</a:t>
+              <a:t>1</a:t>
             </a:r>
             <a:endParaRPr lang="en-US" sz="900" dirty="0"/>
           </a:p>
@@ -6627,6 +6556,884 @@
           <a:chExt cx="0" cy="0"/>
         </a:xfrm>
       </p:grpSpPr>
+      <p:sp>
+        <p:nvSpPr>
+          <p:cNvPr id="5" name="TextBox 4"/>
+          <p:cNvSpPr txBox="1"/>
+          <p:nvPr/>
+        </p:nvSpPr>
+        <p:spPr>
+          <a:xfrm>
+            <a:off x="3450512" y="2939557"/>
+            <a:ext cx="3315285" cy="215444"/>
+          </a:xfrm>
+          <a:prstGeom prst="rect">
+            <a:avLst/>
+          </a:prstGeom>
+          <a:noFill/>
+        </p:spPr>
+        <p:txBody>
+          <a:bodyPr wrap="square" lIns="0" tIns="0" rIns="0" bIns="0" rtlCol="0">
+            <a:spAutoFit/>
+          </a:bodyPr>
+          <a:lstStyle/>
+          <a:p>
+            <a:r>
+              <a:rPr lang="en-US" sz="1400" dirty="0">
+                <a:solidFill>
+                  <a:schemeClr val="accent5">
+                    <a:lumMod val="75000"/>
+                  </a:schemeClr>
+                </a:solidFill>
+              </a:rPr>
+              <a:t>post(</a:t>
+            </a:r>
+            <a:r>
+              <a:rPr lang="en-US" sz="1400" dirty="0" err="1">
+                <a:solidFill>
+                  <a:schemeClr val="accent5">
+                    <a:lumMod val="75000"/>
+                  </a:schemeClr>
+                </a:solidFill>
+              </a:rPr>
+              <a:t>JumpToIndexedTaskRequestEvent</a:t>
+            </a:r>
+            <a:r>
+              <a:rPr lang="en-US" sz="1400" dirty="0">
+                <a:solidFill>
+                  <a:schemeClr val="accent5">
+                    <a:lumMod val="75000"/>
+                  </a:schemeClr>
+                </a:solidFill>
+              </a:rPr>
+              <a:t>)</a:t>
+            </a:r>
+            <a:endParaRPr lang="en-US" sz="1400" dirty="0">
+              <a:solidFill>
+                <a:schemeClr val="accent5">
+                  <a:lumMod val="75000"/>
+                </a:schemeClr>
+              </a:solidFill>
+            </a:endParaRPr>
+          </a:p>
+        </p:txBody>
+      </p:sp>
+      <p:sp>
+        <p:nvSpPr>
+          <p:cNvPr id="7" name="Rectangle 62"/>
+          <p:cNvSpPr/>
+          <p:nvPr/>
+        </p:nvSpPr>
+        <p:spPr>
+          <a:xfrm>
+            <a:off x="5742678" y="2420205"/>
+            <a:ext cx="1371600" cy="346760"/>
+          </a:xfrm>
+          <a:prstGeom prst="rect">
+            <a:avLst/>
+          </a:prstGeom>
+          <a:solidFill>
+            <a:schemeClr val="accent5">
+              <a:lumMod val="75000"/>
+            </a:schemeClr>
+          </a:solidFill>
+          <a:ln w="19050">
+            <a:solidFill>
+              <a:schemeClr val="accent5">
+                <a:lumMod val="75000"/>
+              </a:schemeClr>
+            </a:solidFill>
+          </a:ln>
+          <a:effectLst/>
+        </p:spPr>
+        <p:style>
+          <a:lnRef idx="1">
+            <a:schemeClr val="accent2"/>
+          </a:lnRef>
+          <a:fillRef idx="2">
+            <a:schemeClr val="accent2"/>
+          </a:fillRef>
+          <a:effectRef idx="1">
+            <a:schemeClr val="accent2"/>
+          </a:effectRef>
+          <a:fontRef idx="minor">
+            <a:schemeClr val="dk1"/>
+          </a:fontRef>
+        </p:style>
+        <p:txBody>
+          <a:bodyPr rtlCol="0" anchor="ctr"/>
+          <a:lstStyle/>
+          <a:p>
+            <a:pPr algn="ctr"/>
+            <a:r>
+              <a:rPr lang="en-US" sz="1600" dirty="0">
+                <a:solidFill>
+                  <a:schemeClr val="bg1"/>
+                </a:solidFill>
+              </a:rPr>
+              <a:t>:</a:t>
+            </a:r>
+            <a:r>
+              <a:rPr lang="en-US" sz="1600" dirty="0" err="1">
+                <a:solidFill>
+                  <a:schemeClr val="bg1"/>
+                </a:solidFill>
+              </a:rPr>
+              <a:t>EventsCenter</a:t>
+            </a:r>
+            <a:endParaRPr lang="en-SG" sz="1600" dirty="0">
+              <a:solidFill>
+                <a:schemeClr val="bg1"/>
+              </a:solidFill>
+            </a:endParaRPr>
+          </a:p>
+        </p:txBody>
+      </p:sp>
+      <p:cxnSp>
+        <p:nvCxnSpPr>
+          <p:cNvPr id="8" name="Straight Connector 7"/>
+          <p:cNvCxnSpPr/>
+          <p:nvPr/>
+        </p:nvCxnSpPr>
+        <p:spPr>
+          <a:xfrm>
+            <a:off x="6408263" y="2773259"/>
+            <a:ext cx="0" cy="1723059"/>
+          </a:xfrm>
+          <a:prstGeom prst="line">
+            <a:avLst/>
+          </a:prstGeom>
+          <a:ln w="19050">
+            <a:solidFill>
+              <a:schemeClr val="accent5">
+                <a:lumMod val="75000"/>
+              </a:schemeClr>
+            </a:solidFill>
+            <a:prstDash val="sysDash"/>
+          </a:ln>
+          <a:effectLst/>
+        </p:spPr>
+        <p:style>
+          <a:lnRef idx="1">
+            <a:schemeClr val="accent1"/>
+          </a:lnRef>
+          <a:fillRef idx="2">
+            <a:schemeClr val="accent1"/>
+          </a:fillRef>
+          <a:effectRef idx="1">
+            <a:schemeClr val="accent1"/>
+          </a:effectRef>
+          <a:fontRef idx="minor">
+            <a:schemeClr val="dk1"/>
+          </a:fontRef>
+        </p:style>
+      </p:cxnSp>
+      <p:sp>
+        <p:nvSpPr>
+          <p:cNvPr id="9" name="Rectangle 8"/>
+          <p:cNvSpPr/>
+          <p:nvPr/>
+        </p:nvSpPr>
+        <p:spPr>
+          <a:xfrm>
+            <a:off x="6336255" y="3196192"/>
+            <a:ext cx="142006" cy="1205213"/>
+          </a:xfrm>
+          <a:prstGeom prst="rect">
+            <a:avLst/>
+          </a:prstGeom>
+          <a:solidFill>
+            <a:schemeClr val="accent5">
+              <a:lumMod val="75000"/>
+            </a:schemeClr>
+          </a:solidFill>
+          <a:ln>
+            <a:solidFill>
+              <a:schemeClr val="accent5">
+                <a:lumMod val="75000"/>
+              </a:schemeClr>
+            </a:solidFill>
+          </a:ln>
+          <a:effectLst/>
+        </p:spPr>
+        <p:style>
+          <a:lnRef idx="1">
+            <a:schemeClr val="accent3"/>
+          </a:lnRef>
+          <a:fillRef idx="2">
+            <a:schemeClr val="accent3"/>
+          </a:fillRef>
+          <a:effectRef idx="1">
+            <a:schemeClr val="accent3"/>
+          </a:effectRef>
+          <a:fontRef idx="minor">
+            <a:schemeClr val="dk1"/>
+          </a:fontRef>
+        </p:style>
+        <p:txBody>
+          <a:bodyPr rtlCol="0" anchor="ctr"/>
+          <a:lstStyle/>
+          <a:p>
+            <a:pPr algn="ctr"/>
+            <a:endParaRPr lang="en-SG" sz="1400">
+              <a:solidFill>
+                <a:schemeClr val="dk1"/>
+              </a:solidFill>
+            </a:endParaRPr>
+          </a:p>
+        </p:txBody>
+      </p:sp>
+      <p:cxnSp>
+        <p:nvCxnSpPr>
+          <p:cNvPr id="10" name="Straight Arrow Connector 9"/>
+          <p:cNvCxnSpPr/>
+          <p:nvPr/>
+        </p:nvCxnSpPr>
+        <p:spPr>
+          <a:xfrm>
+            <a:off x="5030461" y="3196192"/>
+            <a:ext cx="1295400" cy="0"/>
+          </a:xfrm>
+          <a:prstGeom prst="straightConnector1">
+            <a:avLst/>
+          </a:prstGeom>
+          <a:ln w="19050">
+            <a:solidFill>
+              <a:srgbClr val="7030A0"/>
+            </a:solidFill>
+            <a:tailEnd type="arrow"/>
+          </a:ln>
+        </p:spPr>
+        <p:style>
+          <a:lnRef idx="1">
+            <a:schemeClr val="accent1"/>
+          </a:lnRef>
+          <a:fillRef idx="0">
+            <a:schemeClr val="accent1"/>
+          </a:fillRef>
+          <a:effectRef idx="0">
+            <a:schemeClr val="accent1"/>
+          </a:effectRef>
+          <a:fontRef idx="minor">
+            <a:schemeClr val="tx1"/>
+          </a:fontRef>
+        </p:style>
+      </p:cxnSp>
+      <p:cxnSp>
+        <p:nvCxnSpPr>
+          <p:cNvPr id="11" name="Straight Arrow Connector 10"/>
+          <p:cNvCxnSpPr/>
+          <p:nvPr/>
+        </p:nvCxnSpPr>
+        <p:spPr>
+          <a:xfrm>
+            <a:off x="4913461" y="4325205"/>
+            <a:ext cx="1448755" cy="0"/>
+          </a:xfrm>
+          <a:prstGeom prst="straightConnector1">
+            <a:avLst/>
+          </a:prstGeom>
+          <a:ln w="19050">
+            <a:solidFill>
+              <a:schemeClr val="accent5">
+                <a:lumMod val="75000"/>
+              </a:schemeClr>
+            </a:solidFill>
+            <a:prstDash val="sysDash"/>
+            <a:headEnd type="arrow" w="med" len="med"/>
+            <a:tailEnd type="none" w="med" len="med"/>
+          </a:ln>
+        </p:spPr>
+        <p:style>
+          <a:lnRef idx="1">
+            <a:schemeClr val="accent1"/>
+          </a:lnRef>
+          <a:fillRef idx="0">
+            <a:schemeClr val="accent1"/>
+          </a:fillRef>
+          <a:effectRef idx="0">
+            <a:schemeClr val="accent1"/>
+          </a:effectRef>
+          <a:fontRef idx="minor">
+            <a:schemeClr val="tx1"/>
+          </a:fontRef>
+        </p:style>
+      </p:cxnSp>
+      <p:sp>
+        <p:nvSpPr>
+          <p:cNvPr id="14" name="Rectangle 62"/>
+          <p:cNvSpPr/>
+          <p:nvPr/>
+        </p:nvSpPr>
+        <p:spPr>
+          <a:xfrm>
+            <a:off x="2438400" y="2406650"/>
+            <a:ext cx="1093635" cy="346760"/>
+          </a:xfrm>
+          <a:prstGeom prst="rect">
+            <a:avLst/>
+          </a:prstGeom>
+          <a:solidFill>
+            <a:srgbClr val="00B050"/>
+          </a:solidFill>
+          <a:ln w="19050">
+            <a:solidFill>
+              <a:srgbClr val="00B050"/>
+            </a:solidFill>
+          </a:ln>
+          <a:effectLst/>
+        </p:spPr>
+        <p:style>
+          <a:lnRef idx="1">
+            <a:schemeClr val="accent2"/>
+          </a:lnRef>
+          <a:fillRef idx="2">
+            <a:schemeClr val="accent2"/>
+          </a:fillRef>
+          <a:effectRef idx="1">
+            <a:schemeClr val="accent2"/>
+          </a:effectRef>
+          <a:fontRef idx="minor">
+            <a:schemeClr val="dk1"/>
+          </a:fontRef>
+        </p:style>
+        <p:txBody>
+          <a:bodyPr rtlCol="0" anchor="ctr"/>
+          <a:lstStyle/>
+          <a:p>
+            <a:pPr algn="ctr"/>
+            <a:r>
+              <a:rPr lang="en-US" sz="1600" dirty="0">
+                <a:solidFill>
+                  <a:schemeClr val="bg1"/>
+                </a:solidFill>
+              </a:rPr>
+              <a:t>:UI</a:t>
+            </a:r>
+            <a:endParaRPr lang="en-SG" sz="1600" dirty="0">
+              <a:solidFill>
+                <a:schemeClr val="bg1"/>
+              </a:solidFill>
+            </a:endParaRPr>
+          </a:p>
+        </p:txBody>
+      </p:sp>
+      <p:cxnSp>
+        <p:nvCxnSpPr>
+          <p:cNvPr id="15" name="Straight Connector 14"/>
+          <p:cNvCxnSpPr/>
+          <p:nvPr/>
+        </p:nvCxnSpPr>
+        <p:spPr>
+          <a:xfrm>
+            <a:off x="2985217" y="2770321"/>
+            <a:ext cx="0" cy="1723059"/>
+          </a:xfrm>
+          <a:prstGeom prst="line">
+            <a:avLst/>
+          </a:prstGeom>
+          <a:ln w="19050">
+            <a:solidFill>
+              <a:srgbClr val="00B050"/>
+            </a:solidFill>
+            <a:prstDash val="sysDash"/>
+          </a:ln>
+          <a:effectLst/>
+        </p:spPr>
+        <p:style>
+          <a:lnRef idx="1">
+            <a:schemeClr val="accent1"/>
+          </a:lnRef>
+          <a:fillRef idx="2">
+            <a:schemeClr val="accent1"/>
+          </a:fillRef>
+          <a:effectRef idx="1">
+            <a:schemeClr val="accent1"/>
+          </a:effectRef>
+          <a:fontRef idx="minor">
+            <a:schemeClr val="dk1"/>
+          </a:fontRef>
+        </p:style>
+      </p:cxnSp>
+      <p:sp>
+        <p:nvSpPr>
+          <p:cNvPr id="16" name="Rectangle 15"/>
+          <p:cNvSpPr/>
+          <p:nvPr/>
+        </p:nvSpPr>
+        <p:spPr>
+          <a:xfrm>
+            <a:off x="2913209" y="3798799"/>
+            <a:ext cx="129431" cy="437505"/>
+          </a:xfrm>
+          <a:prstGeom prst="rect">
+            <a:avLst/>
+          </a:prstGeom>
+          <a:solidFill>
+            <a:srgbClr val="00B050"/>
+          </a:solidFill>
+          <a:ln>
+            <a:solidFill>
+              <a:srgbClr val="00B050"/>
+            </a:solidFill>
+          </a:ln>
+          <a:effectLst/>
+        </p:spPr>
+        <p:style>
+          <a:lnRef idx="1">
+            <a:schemeClr val="accent3"/>
+          </a:lnRef>
+          <a:fillRef idx="2">
+            <a:schemeClr val="accent3"/>
+          </a:fillRef>
+          <a:effectRef idx="1">
+            <a:schemeClr val="accent3"/>
+          </a:effectRef>
+          <a:fontRef idx="minor">
+            <a:schemeClr val="dk1"/>
+          </a:fontRef>
+        </p:style>
+        <p:txBody>
+          <a:bodyPr rtlCol="0" anchor="ctr"/>
+          <a:lstStyle/>
+          <a:p>
+            <a:pPr algn="ctr"/>
+            <a:endParaRPr lang="en-SG" sz="1400">
+              <a:solidFill>
+                <a:schemeClr val="dk1"/>
+              </a:solidFill>
+            </a:endParaRPr>
+          </a:p>
+        </p:txBody>
+      </p:sp>
+      <p:cxnSp>
+        <p:nvCxnSpPr>
+          <p:cNvPr id="17" name="Straight Arrow Connector 16"/>
+          <p:cNvCxnSpPr/>
+          <p:nvPr/>
+        </p:nvCxnSpPr>
+        <p:spPr>
+          <a:xfrm flipH="1" flipV="1">
+            <a:off x="3065609" y="4176161"/>
+            <a:ext cx="3270646" cy="15984"/>
+          </a:xfrm>
+          <a:prstGeom prst="straightConnector1">
+            <a:avLst/>
+          </a:prstGeom>
+          <a:ln w="19050">
+            <a:solidFill>
+              <a:srgbClr val="00B050"/>
+            </a:solidFill>
+            <a:prstDash val="sysDash"/>
+            <a:headEnd type="arrow" w="med" len="med"/>
+            <a:tailEnd type="none" w="med" len="med"/>
+          </a:ln>
+        </p:spPr>
+        <p:style>
+          <a:lnRef idx="1">
+            <a:schemeClr val="accent1"/>
+          </a:lnRef>
+          <a:fillRef idx="0">
+            <a:schemeClr val="accent1"/>
+          </a:fillRef>
+          <a:effectRef idx="0">
+            <a:schemeClr val="accent1"/>
+          </a:effectRef>
+          <a:fontRef idx="minor">
+            <a:schemeClr val="tx1"/>
+          </a:fontRef>
+        </p:style>
+      </p:cxnSp>
+      <p:cxnSp>
+        <p:nvCxnSpPr>
+          <p:cNvPr id="18" name="Straight Arrow Connector 17"/>
+          <p:cNvCxnSpPr>
+            <a:endCxn id="9" idx="1"/>
+          </p:cNvCxnSpPr>
+          <p:nvPr/>
+        </p:nvCxnSpPr>
+        <p:spPr>
+          <a:xfrm flipV="1">
+            <a:off x="3065609" y="3798799"/>
+            <a:ext cx="3270646" cy="1"/>
+          </a:xfrm>
+          <a:prstGeom prst="straightConnector1">
+            <a:avLst/>
+          </a:prstGeom>
+          <a:ln w="19050">
+            <a:solidFill>
+              <a:schemeClr val="accent5">
+                <a:lumMod val="75000"/>
+              </a:schemeClr>
+            </a:solidFill>
+            <a:headEnd type="arrow" w="med" len="med"/>
+            <a:tailEnd type="none" w="med" len="med"/>
+          </a:ln>
+        </p:spPr>
+        <p:style>
+          <a:lnRef idx="1">
+            <a:schemeClr val="accent1"/>
+          </a:lnRef>
+          <a:fillRef idx="0">
+            <a:schemeClr val="accent1"/>
+          </a:fillRef>
+          <a:effectRef idx="0">
+            <a:schemeClr val="accent1"/>
+          </a:effectRef>
+          <a:fontRef idx="minor">
+            <a:schemeClr val="tx1"/>
+          </a:fontRef>
+        </p:style>
+      </p:cxnSp>
+      <p:sp>
+        <p:nvSpPr>
+          <p:cNvPr id="19" name="TextBox 18"/>
+          <p:cNvSpPr txBox="1"/>
+          <p:nvPr/>
+        </p:nvSpPr>
+        <p:spPr>
+          <a:xfrm>
+            <a:off x="3268825" y="3558017"/>
+            <a:ext cx="3289271" cy="215444"/>
+          </a:xfrm>
+          <a:prstGeom prst="rect">
+            <a:avLst/>
+          </a:prstGeom>
+          <a:noFill/>
+        </p:spPr>
+        <p:txBody>
+          <a:bodyPr wrap="square" lIns="0" tIns="0" rIns="0" bIns="0" rtlCol="0">
+            <a:spAutoFit/>
+          </a:bodyPr>
+          <a:lstStyle/>
+          <a:p>
+            <a:r>
+              <a:rPr lang="en-US" sz="1400" smtClean="0">
+                <a:solidFill>
+                  <a:srgbClr val="00B050"/>
+                </a:solidFill>
+              </a:rPr>
+              <a:t>handleJumpToIndexedTaskRequestEvent</a:t>
+            </a:r>
+            <a:r>
+              <a:rPr lang="en-US" sz="1400" dirty="0" smtClean="0">
+                <a:solidFill>
+                  <a:srgbClr val="00B050"/>
+                </a:solidFill>
+              </a:rPr>
+              <a:t>()</a:t>
+            </a:r>
+            <a:endParaRPr lang="en-US" sz="1400" dirty="0">
+              <a:solidFill>
+                <a:srgbClr val="00B050"/>
+              </a:solidFill>
+            </a:endParaRPr>
+          </a:p>
+        </p:txBody>
+      </p:sp>
+      <p:sp>
+        <p:nvSpPr>
+          <p:cNvPr id="21" name="Freeform 20"/>
+          <p:cNvSpPr/>
+          <p:nvPr/>
+        </p:nvSpPr>
+        <p:spPr>
+          <a:xfrm rot="2600998" flipH="1" flipV="1">
+            <a:off x="2713610" y="3786234"/>
+            <a:ext cx="205651" cy="106595"/>
+          </a:xfrm>
+          <a:custGeom>
+            <a:avLst/>
+            <a:gdLst>
+              <a:gd name="connsiteX0" fmla="*/ 0 w 226400"/>
+              <a:gd name="connsiteY0" fmla="*/ 32920 h 171466"/>
+              <a:gd name="connsiteX1" fmla="*/ 157018 w 226400"/>
+              <a:gd name="connsiteY1" fmla="*/ 5211 h 171466"/>
+              <a:gd name="connsiteX2" fmla="*/ 221673 w 226400"/>
+              <a:gd name="connsiteY2" fmla="*/ 125284 h 171466"/>
+              <a:gd name="connsiteX3" fmla="*/ 36945 w 226400"/>
+              <a:gd name="connsiteY3" fmla="*/ 171466 h 171466"/>
+            </a:gdLst>
+            <a:ahLst/>
+            <a:cxnLst>
+              <a:cxn ang="0">
+                <a:pos x="connsiteX0" y="connsiteY0"/>
+              </a:cxn>
+              <a:cxn ang="0">
+                <a:pos x="connsiteX1" y="connsiteY1"/>
+              </a:cxn>
+              <a:cxn ang="0">
+                <a:pos x="connsiteX2" y="connsiteY2"/>
+              </a:cxn>
+              <a:cxn ang="0">
+                <a:pos x="connsiteX3" y="connsiteY3"/>
+              </a:cxn>
+            </a:cxnLst>
+            <a:rect l="l" t="t" r="r" b="b"/>
+            <a:pathLst>
+              <a:path w="226400" h="171466">
+                <a:moveTo>
+                  <a:pt x="0" y="32920"/>
+                </a:moveTo>
+                <a:cubicBezTo>
+                  <a:pt x="60036" y="11368"/>
+                  <a:pt x="120073" y="-10183"/>
+                  <a:pt x="157018" y="5211"/>
+                </a:cubicBezTo>
+                <a:cubicBezTo>
+                  <a:pt x="193963" y="20605"/>
+                  <a:pt x="241685" y="97575"/>
+                  <a:pt x="221673" y="125284"/>
+                </a:cubicBezTo>
+                <a:cubicBezTo>
+                  <a:pt x="201661" y="152993"/>
+                  <a:pt x="119303" y="162229"/>
+                  <a:pt x="36945" y="171466"/>
+                </a:cubicBezTo>
+              </a:path>
+            </a:pathLst>
+          </a:custGeom>
+          <a:ln w="19050">
+            <a:solidFill>
+              <a:srgbClr val="00B050"/>
+            </a:solidFill>
+            <a:headEnd type="arrow" w="med" len="med"/>
+            <a:tailEnd type="none" w="med" len="med"/>
+          </a:ln>
+        </p:spPr>
+        <p:style>
+          <a:lnRef idx="1">
+            <a:schemeClr val="accent1"/>
+          </a:lnRef>
+          <a:fillRef idx="0">
+            <a:schemeClr val="accent1"/>
+          </a:fillRef>
+          <a:effectRef idx="0">
+            <a:schemeClr val="accent1"/>
+          </a:effectRef>
+          <a:fontRef idx="minor">
+            <a:schemeClr val="tx1"/>
+          </a:fontRef>
+        </p:style>
+        <p:txBody>
+          <a:bodyPr rtlCol="0" anchor="ctr"/>
+          <a:lstStyle/>
+          <a:p>
+            <a:pPr algn="ctr"/>
+            <a:endParaRPr lang="en-SG"/>
+          </a:p>
+        </p:txBody>
+      </p:sp>
+      <p:sp>
+        <p:nvSpPr>
+          <p:cNvPr id="22" name="Rectangle 21"/>
+          <p:cNvSpPr/>
+          <p:nvPr/>
+        </p:nvSpPr>
+        <p:spPr>
+          <a:xfrm>
+            <a:off x="2857660" y="3889690"/>
+            <a:ext cx="78266" cy="186887"/>
+          </a:xfrm>
+          <a:prstGeom prst="rect">
+            <a:avLst/>
+          </a:prstGeom>
+          <a:solidFill>
+            <a:srgbClr val="00B050"/>
+          </a:solidFill>
+          <a:ln>
+            <a:solidFill>
+              <a:schemeClr val="bg1"/>
+            </a:solidFill>
+          </a:ln>
+          <a:effectLst/>
+        </p:spPr>
+        <p:style>
+          <a:lnRef idx="1">
+            <a:schemeClr val="accent3"/>
+          </a:lnRef>
+          <a:fillRef idx="2">
+            <a:schemeClr val="accent3"/>
+          </a:fillRef>
+          <a:effectRef idx="1">
+            <a:schemeClr val="accent3"/>
+          </a:effectRef>
+          <a:fontRef idx="minor">
+            <a:schemeClr val="dk1"/>
+          </a:fontRef>
+        </p:style>
+        <p:txBody>
+          <a:bodyPr rtlCol="0" anchor="ctr"/>
+          <a:lstStyle/>
+          <a:p>
+            <a:pPr algn="ctr"/>
+            <a:endParaRPr lang="en-SG" sz="1400">
+              <a:solidFill>
+                <a:schemeClr val="dk1"/>
+              </a:solidFill>
+            </a:endParaRPr>
+          </a:p>
+        </p:txBody>
+      </p:sp>
+      <p:sp>
+        <p:nvSpPr>
+          <p:cNvPr id="23" name="TextBox 22"/>
+          <p:cNvSpPr txBox="1"/>
+          <p:nvPr/>
+        </p:nvSpPr>
+        <p:spPr>
+          <a:xfrm>
+            <a:off x="1911328" y="3572899"/>
+            <a:ext cx="794081" cy="430887"/>
+          </a:xfrm>
+          <a:prstGeom prst="rect">
+            <a:avLst/>
+          </a:prstGeom>
+          <a:noFill/>
+        </p:spPr>
+        <p:txBody>
+          <a:bodyPr wrap="square" lIns="0" tIns="0" rIns="0" bIns="0" rtlCol="0">
+            <a:spAutoFit/>
+          </a:bodyPr>
+          <a:lstStyle/>
+          <a:p>
+            <a:pPr algn="r"/>
+            <a:r>
+              <a:rPr lang="en-US" altLang="zh-CN" sz="1400" dirty="0" smtClean="0">
+                <a:solidFill>
+                  <a:srgbClr val="00B050"/>
+                </a:solidFill>
+              </a:rPr>
+              <a:t>Scroll</a:t>
+            </a:r>
+            <a:r>
+              <a:rPr lang="zh-CN" altLang="en-US" sz="1400" dirty="0" smtClean="0">
+                <a:solidFill>
+                  <a:srgbClr val="00B050"/>
+                </a:solidFill>
+              </a:rPr>
+              <a:t> </a:t>
+            </a:r>
+            <a:r>
+              <a:rPr lang="en-US" altLang="zh-CN" sz="1400" dirty="0" smtClean="0">
+                <a:solidFill>
+                  <a:srgbClr val="00B050"/>
+                </a:solidFill>
+              </a:rPr>
+              <a:t>to</a:t>
+            </a:r>
+          </a:p>
+          <a:p>
+            <a:pPr algn="r"/>
+            <a:r>
+              <a:rPr lang="en-US" altLang="zh-CN" sz="1400" dirty="0" err="1" smtClean="0">
+                <a:solidFill>
+                  <a:srgbClr val="00B050"/>
+                </a:solidFill>
+              </a:rPr>
+              <a:t>TaskCard</a:t>
+            </a:r>
+            <a:endParaRPr lang="en-US" sz="1400" dirty="0">
+              <a:solidFill>
+                <a:srgbClr val="00B050"/>
+              </a:solidFill>
+            </a:endParaRPr>
+          </a:p>
+        </p:txBody>
+      </p:sp>
+      <p:sp>
+        <p:nvSpPr>
+          <p:cNvPr id="32" name="Freeform 31"/>
+          <p:cNvSpPr/>
+          <p:nvPr/>
+        </p:nvSpPr>
+        <p:spPr>
+          <a:xfrm>
+            <a:off x="2705078" y="4039764"/>
+            <a:ext cx="222716" cy="152381"/>
+          </a:xfrm>
+          <a:custGeom>
+            <a:avLst/>
+            <a:gdLst>
+              <a:gd name="connsiteX0" fmla="*/ 89796 w 131837"/>
+              <a:gd name="connsiteY0" fmla="*/ 122 h 157777"/>
+              <a:gd name="connsiteX1" fmla="*/ 458 w 131837"/>
+              <a:gd name="connsiteY1" fmla="*/ 21143 h 157777"/>
+              <a:gd name="connsiteX2" fmla="*/ 58265 w 131837"/>
+              <a:gd name="connsiteY2" fmla="*/ 131502 h 157777"/>
+              <a:gd name="connsiteX3" fmla="*/ 131837 w 131837"/>
+              <a:gd name="connsiteY3" fmla="*/ 157777 h 157777"/>
+            </a:gdLst>
+            <a:ahLst/>
+            <a:cxnLst>
+              <a:cxn ang="0">
+                <a:pos x="connsiteX0" y="connsiteY0"/>
+              </a:cxn>
+              <a:cxn ang="0">
+                <a:pos x="connsiteX1" y="connsiteY1"/>
+              </a:cxn>
+              <a:cxn ang="0">
+                <a:pos x="connsiteX2" y="connsiteY2"/>
+              </a:cxn>
+              <a:cxn ang="0">
+                <a:pos x="connsiteX3" y="connsiteY3"/>
+              </a:cxn>
+            </a:cxnLst>
+            <a:rect l="l" t="t" r="r" b="b"/>
+            <a:pathLst>
+              <a:path w="131837" h="157777">
+                <a:moveTo>
+                  <a:pt x="89796" y="122"/>
+                </a:moveTo>
+                <a:cubicBezTo>
+                  <a:pt x="47754" y="-316"/>
+                  <a:pt x="5713" y="-754"/>
+                  <a:pt x="458" y="21143"/>
+                </a:cubicBezTo>
+                <a:cubicBezTo>
+                  <a:pt x="-4797" y="43040"/>
+                  <a:pt x="36369" y="108730"/>
+                  <a:pt x="58265" y="131502"/>
+                </a:cubicBezTo>
+                <a:cubicBezTo>
+                  <a:pt x="80161" y="154274"/>
+                  <a:pt x="127458" y="154274"/>
+                  <a:pt x="131837" y="157777"/>
+                </a:cubicBezTo>
+              </a:path>
+            </a:pathLst>
+          </a:custGeom>
+          <a:ln w="19050">
+            <a:solidFill>
+              <a:srgbClr val="00B050"/>
+            </a:solidFill>
+            <a:headEnd type="none" w="med" len="med"/>
+            <a:tailEnd type="arrow" w="med" len="med"/>
+          </a:ln>
+        </p:spPr>
+        <p:style>
+          <a:lnRef idx="1">
+            <a:schemeClr val="accent1"/>
+          </a:lnRef>
+          <a:fillRef idx="0">
+            <a:schemeClr val="accent1"/>
+          </a:fillRef>
+          <a:effectRef idx="0">
+            <a:schemeClr val="accent1"/>
+          </a:effectRef>
+          <a:fontRef idx="minor">
+            <a:schemeClr val="tx1"/>
+          </a:fontRef>
+        </p:style>
+        <p:txBody>
+          <a:bodyPr rtlCol="0" anchor="ctr"/>
+          <a:lstStyle/>
+          <a:p>
+            <a:pPr algn="ctr"/>
+            <a:endParaRPr lang="en-US"/>
+          </a:p>
+        </p:txBody>
+      </p:sp>
     </p:spTree>
     <p:extLst>
       <p:ext uri="{BB962C8B-B14F-4D97-AF65-F5344CB8AC3E}">

</xml_diff>